<commit_message>
Commit before clean up.
</commit_message>
<xml_diff>
--- a/MPC_Compiler_Misc_Notes.pptx
+++ b/MPC_Compiler_Misc_Notes.pptx
@@ -3811,7 +3811,7 @@
           <a:p>
             <a:r>
               <a:rPr lang="en-US" dirty="0" smtClean="0"/>
-              <a:t>TARGET LANGUAGE</a:t>
+              <a:t>TARGET LANGUAGE Examples</a:t>
             </a:r>
             <a:endParaRPr lang="en-US" dirty="0"/>
           </a:p>
@@ -4461,7 +4461,7 @@
           <a:p>
             <a:r>
               <a:rPr lang="en-US" dirty="0" smtClean="0"/>
-              <a:t>TODO: Examples, sum and min</a:t>
+              <a:t>TARGET LANGUAGE Examples</a:t>
             </a:r>
             <a:endParaRPr lang="en-US" dirty="0"/>
           </a:p>
@@ -4469,19 +4469,887 @@
       </p:sp>
       <p:sp>
         <p:nvSpPr>
-          <p:cNvPr id="3" name="Content Placeholder 2"/>
-          <p:cNvSpPr>
-            <a:spLocks noGrp="1"/>
+          <p:cNvPr id="4" name="Content Placeholder 2"/>
+          <p:cNvSpPr txBox="1">
+            <a:spLocks/>
           </p:cNvSpPr>
-          <p:nvPr>
-            <p:ph idx="1"/>
-          </p:nvPr>
+          <p:nvPr/>
         </p:nvSpPr>
-        <p:spPr/>
+        <p:spPr>
+          <a:xfrm>
+            <a:off x="330200" y="1244496"/>
+            <a:ext cx="3812587" cy="2707190"/>
+          </a:xfrm>
+          <a:prstGeom prst="rect">
+            <a:avLst/>
+          </a:prstGeom>
+        </p:spPr>
         <p:txBody>
-          <a:bodyPr/>
+          <a:bodyPr vert="horz" lIns="91440" tIns="45720" rIns="91440" bIns="45720" rtlCol="0">
+            <a:normAutofit lnSpcReduction="10000"/>
+          </a:bodyPr>
+          <a:lstStyle>
+            <a:lvl1pPr marL="342900" indent="-342900" algn="l" defTabSz="457200" rtl="0" eaLnBrk="1" latinLnBrk="0" hangingPunct="1">
+              <a:spcBef>
+                <a:spcPct val="20000"/>
+              </a:spcBef>
+              <a:buFont typeface="Arial"/>
+              <a:buChar char="•"/>
+              <a:defRPr sz="3200" kern="1200">
+                <a:solidFill>
+                  <a:schemeClr val="tx1"/>
+                </a:solidFill>
+                <a:latin typeface="+mn-lt"/>
+                <a:ea typeface="+mn-ea"/>
+                <a:cs typeface="+mn-cs"/>
+              </a:defRPr>
+            </a:lvl1pPr>
+            <a:lvl2pPr marL="742950" indent="-285750" algn="l" defTabSz="457200" rtl="0" eaLnBrk="1" latinLnBrk="0" hangingPunct="1">
+              <a:spcBef>
+                <a:spcPct val="20000"/>
+              </a:spcBef>
+              <a:buFont typeface="Arial"/>
+              <a:buChar char="–"/>
+              <a:defRPr sz="2800" kern="1200">
+                <a:solidFill>
+                  <a:schemeClr val="tx1"/>
+                </a:solidFill>
+                <a:latin typeface="+mn-lt"/>
+                <a:ea typeface="+mn-ea"/>
+                <a:cs typeface="+mn-cs"/>
+              </a:defRPr>
+            </a:lvl2pPr>
+            <a:lvl3pPr marL="1143000" indent="-228600" algn="l" defTabSz="457200" rtl="0" eaLnBrk="1" latinLnBrk="0" hangingPunct="1">
+              <a:spcBef>
+                <a:spcPct val="20000"/>
+              </a:spcBef>
+              <a:buFont typeface="Arial"/>
+              <a:buChar char="•"/>
+              <a:defRPr sz="2400" kern="1200">
+                <a:solidFill>
+                  <a:schemeClr val="tx1"/>
+                </a:solidFill>
+                <a:latin typeface="+mn-lt"/>
+                <a:ea typeface="+mn-ea"/>
+                <a:cs typeface="+mn-cs"/>
+              </a:defRPr>
+            </a:lvl3pPr>
+            <a:lvl4pPr marL="1600200" indent="-228600" algn="l" defTabSz="457200" rtl="0" eaLnBrk="1" latinLnBrk="0" hangingPunct="1">
+              <a:spcBef>
+                <a:spcPct val="20000"/>
+              </a:spcBef>
+              <a:buFont typeface="Arial"/>
+              <a:buChar char="–"/>
+              <a:defRPr sz="2000" kern="1200">
+                <a:solidFill>
+                  <a:schemeClr val="tx1"/>
+                </a:solidFill>
+                <a:latin typeface="+mn-lt"/>
+                <a:ea typeface="+mn-ea"/>
+                <a:cs typeface="+mn-cs"/>
+              </a:defRPr>
+            </a:lvl4pPr>
+            <a:lvl5pPr marL="2057400" indent="-228600" algn="l" defTabSz="457200" rtl="0" eaLnBrk="1" latinLnBrk="0" hangingPunct="1">
+              <a:spcBef>
+                <a:spcPct val="20000"/>
+              </a:spcBef>
+              <a:buFont typeface="Arial"/>
+              <a:buChar char="»"/>
+              <a:defRPr sz="2000" kern="1200">
+                <a:solidFill>
+                  <a:schemeClr val="tx1"/>
+                </a:solidFill>
+                <a:latin typeface="+mn-lt"/>
+                <a:ea typeface="+mn-ea"/>
+                <a:cs typeface="+mn-cs"/>
+              </a:defRPr>
+            </a:lvl5pPr>
+            <a:lvl6pPr marL="2514600" indent="-228600" algn="l" defTabSz="457200" rtl="0" eaLnBrk="1" latinLnBrk="0" hangingPunct="1">
+              <a:spcBef>
+                <a:spcPct val="20000"/>
+              </a:spcBef>
+              <a:buFont typeface="Arial"/>
+              <a:buChar char="•"/>
+              <a:defRPr sz="2000" kern="1200">
+                <a:solidFill>
+                  <a:schemeClr val="tx1"/>
+                </a:solidFill>
+                <a:latin typeface="+mn-lt"/>
+                <a:ea typeface="+mn-ea"/>
+                <a:cs typeface="+mn-cs"/>
+              </a:defRPr>
+            </a:lvl6pPr>
+            <a:lvl7pPr marL="2971800" indent="-228600" algn="l" defTabSz="457200" rtl="0" eaLnBrk="1" latinLnBrk="0" hangingPunct="1">
+              <a:spcBef>
+                <a:spcPct val="20000"/>
+              </a:spcBef>
+              <a:buFont typeface="Arial"/>
+              <a:buChar char="•"/>
+              <a:defRPr sz="2000" kern="1200">
+                <a:solidFill>
+                  <a:schemeClr val="tx1"/>
+                </a:solidFill>
+                <a:latin typeface="+mn-lt"/>
+                <a:ea typeface="+mn-ea"/>
+                <a:cs typeface="+mn-cs"/>
+              </a:defRPr>
+            </a:lvl7pPr>
+            <a:lvl8pPr marL="3429000" indent="-228600" algn="l" defTabSz="457200" rtl="0" eaLnBrk="1" latinLnBrk="0" hangingPunct="1">
+              <a:spcBef>
+                <a:spcPct val="20000"/>
+              </a:spcBef>
+              <a:buFont typeface="Arial"/>
+              <a:buChar char="•"/>
+              <a:defRPr sz="2000" kern="1200">
+                <a:solidFill>
+                  <a:schemeClr val="tx1"/>
+                </a:solidFill>
+                <a:latin typeface="+mn-lt"/>
+                <a:ea typeface="+mn-ea"/>
+                <a:cs typeface="+mn-cs"/>
+              </a:defRPr>
+            </a:lvl8pPr>
+            <a:lvl9pPr marL="3886200" indent="-228600" algn="l" defTabSz="457200" rtl="0" eaLnBrk="1" latinLnBrk="0" hangingPunct="1">
+              <a:spcBef>
+                <a:spcPct val="20000"/>
+              </a:spcBef>
+              <a:buFont typeface="Arial"/>
+              <a:buChar char="•"/>
+              <a:defRPr sz="2000" kern="1200">
+                <a:solidFill>
+                  <a:schemeClr val="tx1"/>
+                </a:solidFill>
+                <a:latin typeface="+mn-lt"/>
+                <a:ea typeface="+mn-ea"/>
+                <a:cs typeface="+mn-cs"/>
+              </a:defRPr>
+            </a:lvl9pPr>
+          </a:lstStyle>
+          <a:p>
+            <a:pPr marL="0" indent="0">
+              <a:buNone/>
+            </a:pPr>
+            <a:r>
+              <a:rPr lang="en-US" dirty="0" smtClean="0"/>
+              <a:t>Iterative min:</a:t>
+            </a:r>
+            <a:endParaRPr lang="en-US" dirty="0" smtClean="0"/>
+          </a:p>
+          <a:p>
+            <a:pPr marL="0" indent="0">
+              <a:buNone/>
+            </a:pPr>
+            <a:r>
+              <a:rPr lang="en-US" dirty="0" smtClean="0"/>
+              <a:t>min</a:t>
+            </a:r>
+            <a:r>
+              <a:rPr lang="en-US" dirty="0" smtClean="0"/>
+              <a:t> = A[1]</a:t>
+            </a:r>
+          </a:p>
+          <a:p>
+            <a:pPr marL="0" indent="0">
+              <a:buNone/>
+            </a:pPr>
+            <a:r>
+              <a:rPr lang="en-US" dirty="0" smtClean="0"/>
+              <a:t>for </a:t>
+            </a:r>
+            <a:r>
+              <a:rPr lang="en-US" dirty="0" err="1" smtClean="0"/>
+              <a:t>i</a:t>
+            </a:r>
+            <a:r>
+              <a:rPr lang="en-US" dirty="0" smtClean="0"/>
+              <a:t> in range</a:t>
+            </a:r>
+            <a:r>
+              <a:rPr lang="en-US" dirty="0" smtClean="0"/>
+              <a:t>(</a:t>
+            </a:r>
+            <a:r>
+              <a:rPr lang="en-US" dirty="0"/>
+              <a:t>N</a:t>
+            </a:r>
+            <a:r>
+              <a:rPr lang="en-US" dirty="0" smtClean="0"/>
+              <a:t>)</a:t>
+            </a:r>
+            <a:r>
+              <a:rPr lang="en-US" dirty="0" smtClean="0"/>
+              <a:t>:</a:t>
+            </a:r>
+          </a:p>
+          <a:p>
+            <a:pPr marL="0" indent="0">
+              <a:buNone/>
+            </a:pPr>
+            <a:r>
+              <a:rPr lang="en-US" dirty="0"/>
+              <a:t> </a:t>
+            </a:r>
+            <a:r>
+              <a:rPr lang="en-US" dirty="0" smtClean="0"/>
+              <a:t>   </a:t>
+            </a:r>
+            <a:r>
+              <a:rPr lang="en-US" dirty="0" smtClean="0"/>
+              <a:t>if A[</a:t>
+            </a:r>
+            <a:r>
+              <a:rPr lang="en-US" dirty="0" err="1" smtClean="0"/>
+              <a:t>i</a:t>
+            </a:r>
+            <a:r>
+              <a:rPr lang="en-US" dirty="0" smtClean="0"/>
+              <a:t>] &lt; min</a:t>
+            </a:r>
+            <a:endParaRPr lang="en-US" dirty="0" smtClean="0">
+              <a:solidFill>
+                <a:srgbClr val="0000FF"/>
+              </a:solidFill>
+            </a:endParaRPr>
+          </a:p>
+          <a:p>
+            <a:pPr marL="0" indent="0">
+              <a:buNone/>
+            </a:pPr>
+            <a:r>
+              <a:rPr lang="en-US" dirty="0"/>
+              <a:t> </a:t>
+            </a:r>
+            <a:r>
+              <a:rPr lang="en-US" dirty="0" smtClean="0"/>
+              <a:t>   </a:t>
+            </a:r>
+            <a:r>
+              <a:rPr lang="en-US" dirty="0"/>
+              <a:t> </a:t>
+            </a:r>
+            <a:r>
+              <a:rPr lang="en-US" dirty="0" smtClean="0"/>
+              <a:t>   min = A[</a:t>
+            </a:r>
+            <a:r>
+              <a:rPr lang="en-US" dirty="0" err="1" smtClean="0"/>
+              <a:t>i</a:t>
+            </a:r>
+            <a:r>
+              <a:rPr lang="en-US" dirty="0" smtClean="0"/>
+              <a:t>]</a:t>
+            </a:r>
+            <a:endParaRPr lang="en-US" dirty="0"/>
+          </a:p>
+        </p:txBody>
+      </p:sp>
+      <p:sp>
+        <p:nvSpPr>
+          <p:cNvPr id="5" name="Content Placeholder 2"/>
+          <p:cNvSpPr txBox="1">
+            <a:spLocks/>
+          </p:cNvSpPr>
+          <p:nvPr/>
+        </p:nvSpPr>
+        <p:spPr>
+          <a:xfrm>
+            <a:off x="4368800" y="1249258"/>
+            <a:ext cx="4559300" cy="2707190"/>
+          </a:xfrm>
+          <a:prstGeom prst="rect">
+            <a:avLst/>
+          </a:prstGeom>
+        </p:spPr>
+        <p:txBody>
+          <a:bodyPr vert="horz" lIns="91440" tIns="45720" rIns="91440" bIns="45720" rtlCol="0">
+            <a:normAutofit/>
+          </a:bodyPr>
+          <a:lstStyle>
+            <a:lvl1pPr marL="342900" indent="-342900" algn="l" defTabSz="457200" rtl="0" eaLnBrk="1" latinLnBrk="0" hangingPunct="1">
+              <a:spcBef>
+                <a:spcPct val="20000"/>
+              </a:spcBef>
+              <a:buFont typeface="Arial"/>
+              <a:buChar char="•"/>
+              <a:defRPr sz="3200" kern="1200">
+                <a:solidFill>
+                  <a:schemeClr val="tx1"/>
+                </a:solidFill>
+                <a:latin typeface="+mn-lt"/>
+                <a:ea typeface="+mn-ea"/>
+                <a:cs typeface="+mn-cs"/>
+              </a:defRPr>
+            </a:lvl1pPr>
+            <a:lvl2pPr marL="742950" indent="-285750" algn="l" defTabSz="457200" rtl="0" eaLnBrk="1" latinLnBrk="0" hangingPunct="1">
+              <a:spcBef>
+                <a:spcPct val="20000"/>
+              </a:spcBef>
+              <a:buFont typeface="Arial"/>
+              <a:buChar char="–"/>
+              <a:defRPr sz="2800" kern="1200">
+                <a:solidFill>
+                  <a:schemeClr val="tx1"/>
+                </a:solidFill>
+                <a:latin typeface="+mn-lt"/>
+                <a:ea typeface="+mn-ea"/>
+                <a:cs typeface="+mn-cs"/>
+              </a:defRPr>
+            </a:lvl2pPr>
+            <a:lvl3pPr marL="1143000" indent="-228600" algn="l" defTabSz="457200" rtl="0" eaLnBrk="1" latinLnBrk="0" hangingPunct="1">
+              <a:spcBef>
+                <a:spcPct val="20000"/>
+              </a:spcBef>
+              <a:buFont typeface="Arial"/>
+              <a:buChar char="•"/>
+              <a:defRPr sz="2400" kern="1200">
+                <a:solidFill>
+                  <a:schemeClr val="tx1"/>
+                </a:solidFill>
+                <a:latin typeface="+mn-lt"/>
+                <a:ea typeface="+mn-ea"/>
+                <a:cs typeface="+mn-cs"/>
+              </a:defRPr>
+            </a:lvl3pPr>
+            <a:lvl4pPr marL="1600200" indent="-228600" algn="l" defTabSz="457200" rtl="0" eaLnBrk="1" latinLnBrk="0" hangingPunct="1">
+              <a:spcBef>
+                <a:spcPct val="20000"/>
+              </a:spcBef>
+              <a:buFont typeface="Arial"/>
+              <a:buChar char="–"/>
+              <a:defRPr sz="2000" kern="1200">
+                <a:solidFill>
+                  <a:schemeClr val="tx1"/>
+                </a:solidFill>
+                <a:latin typeface="+mn-lt"/>
+                <a:ea typeface="+mn-ea"/>
+                <a:cs typeface="+mn-cs"/>
+              </a:defRPr>
+            </a:lvl4pPr>
+            <a:lvl5pPr marL="2057400" indent="-228600" algn="l" defTabSz="457200" rtl="0" eaLnBrk="1" latinLnBrk="0" hangingPunct="1">
+              <a:spcBef>
+                <a:spcPct val="20000"/>
+              </a:spcBef>
+              <a:buFont typeface="Arial"/>
+              <a:buChar char="»"/>
+              <a:defRPr sz="2000" kern="1200">
+                <a:solidFill>
+                  <a:schemeClr val="tx1"/>
+                </a:solidFill>
+                <a:latin typeface="+mn-lt"/>
+                <a:ea typeface="+mn-ea"/>
+                <a:cs typeface="+mn-cs"/>
+              </a:defRPr>
+            </a:lvl5pPr>
+            <a:lvl6pPr marL="2514600" indent="-228600" algn="l" defTabSz="457200" rtl="0" eaLnBrk="1" latinLnBrk="0" hangingPunct="1">
+              <a:spcBef>
+                <a:spcPct val="20000"/>
+              </a:spcBef>
+              <a:buFont typeface="Arial"/>
+              <a:buChar char="•"/>
+              <a:defRPr sz="2000" kern="1200">
+                <a:solidFill>
+                  <a:schemeClr val="tx1"/>
+                </a:solidFill>
+                <a:latin typeface="+mn-lt"/>
+                <a:ea typeface="+mn-ea"/>
+                <a:cs typeface="+mn-cs"/>
+              </a:defRPr>
+            </a:lvl6pPr>
+            <a:lvl7pPr marL="2971800" indent="-228600" algn="l" defTabSz="457200" rtl="0" eaLnBrk="1" latinLnBrk="0" hangingPunct="1">
+              <a:spcBef>
+                <a:spcPct val="20000"/>
+              </a:spcBef>
+              <a:buFont typeface="Arial"/>
+              <a:buChar char="•"/>
+              <a:defRPr sz="2000" kern="1200">
+                <a:solidFill>
+                  <a:schemeClr val="tx1"/>
+                </a:solidFill>
+                <a:latin typeface="+mn-lt"/>
+                <a:ea typeface="+mn-ea"/>
+                <a:cs typeface="+mn-cs"/>
+              </a:defRPr>
+            </a:lvl7pPr>
+            <a:lvl8pPr marL="3429000" indent="-228600" algn="l" defTabSz="457200" rtl="0" eaLnBrk="1" latinLnBrk="0" hangingPunct="1">
+              <a:spcBef>
+                <a:spcPct val="20000"/>
+              </a:spcBef>
+              <a:buFont typeface="Arial"/>
+              <a:buChar char="•"/>
+              <a:defRPr sz="2000" kern="1200">
+                <a:solidFill>
+                  <a:schemeClr val="tx1"/>
+                </a:solidFill>
+                <a:latin typeface="+mn-lt"/>
+                <a:ea typeface="+mn-ea"/>
+                <a:cs typeface="+mn-cs"/>
+              </a:defRPr>
+            </a:lvl8pPr>
+            <a:lvl9pPr marL="3886200" indent="-228600" algn="l" defTabSz="457200" rtl="0" eaLnBrk="1" latinLnBrk="0" hangingPunct="1">
+              <a:spcBef>
+                <a:spcPct val="20000"/>
+              </a:spcBef>
+              <a:buFont typeface="Arial"/>
+              <a:buChar char="•"/>
+              <a:defRPr sz="2000" kern="1200">
+                <a:solidFill>
+                  <a:schemeClr val="tx1"/>
+                </a:solidFill>
+                <a:latin typeface="+mn-lt"/>
+                <a:ea typeface="+mn-ea"/>
+                <a:cs typeface="+mn-cs"/>
+              </a:defRPr>
+            </a:lvl9pPr>
+          </a:lstStyle>
+          <a:p>
+            <a:pPr marL="0" indent="0">
+              <a:buNone/>
+            </a:pPr>
+            <a:r>
+              <a:rPr lang="en-US" sz="2600" dirty="0" smtClean="0"/>
+              <a:t>MPC min (after Phases 1-3)</a:t>
+            </a:r>
+            <a:r>
+              <a:rPr lang="en-US" sz="2600" dirty="0" smtClean="0"/>
+              <a:t>:</a:t>
+            </a:r>
+            <a:endParaRPr lang="en-US" sz="2600" dirty="0" smtClean="0"/>
+          </a:p>
+          <a:p>
+            <a:pPr marL="0" indent="0">
+              <a:buNone/>
+            </a:pPr>
+            <a:r>
+              <a:rPr lang="en-US" sz="2600" dirty="0" smtClean="0"/>
+              <a:t>min0 = A[1]</a:t>
+            </a:r>
+            <a:endParaRPr lang="en-US" sz="2600" dirty="0" smtClean="0"/>
+          </a:p>
+          <a:p>
+            <a:pPr marL="0" indent="0">
+              <a:buNone/>
+            </a:pPr>
+            <a:r>
+              <a:rPr lang="en-US" sz="2600" dirty="0" smtClean="0"/>
+              <a:t>f</a:t>
+            </a:r>
+            <a:r>
+              <a:rPr lang="en-US" sz="2600" dirty="0" smtClean="0"/>
+              <a:t>or </a:t>
+            </a:r>
+            <a:r>
+              <a:rPr lang="en-US" sz="2600" dirty="0" err="1" smtClean="0"/>
+              <a:t>i</a:t>
+            </a:r>
+            <a:r>
+              <a:rPr lang="en-US" sz="2600" dirty="0" smtClean="0"/>
+              <a:t> in range(N) </a:t>
+            </a:r>
+          </a:p>
+          <a:p>
+            <a:pPr marL="0" indent="0">
+              <a:buNone/>
+            </a:pPr>
+            <a:r>
+              <a:rPr lang="en-US" sz="2600" dirty="0"/>
+              <a:t>	c</a:t>
+            </a:r>
+            <a:r>
+              <a:rPr lang="en-US" sz="2600" dirty="0" smtClean="0"/>
+              <a:t> = CMP(A[</a:t>
+            </a:r>
+            <a:r>
+              <a:rPr lang="en-US" sz="2600" dirty="0" err="1" smtClean="0"/>
+              <a:t>i</a:t>
+            </a:r>
+            <a:r>
+              <a:rPr lang="en-US" sz="2600" dirty="0" smtClean="0"/>
+              <a:t>],min0)</a:t>
+            </a:r>
+          </a:p>
+          <a:p>
+            <a:pPr marL="0" indent="0">
+              <a:buNone/>
+            </a:pPr>
+            <a:r>
+              <a:rPr lang="en-US" sz="2600" dirty="0" smtClean="0"/>
+              <a:t>	min1</a:t>
+            </a:r>
+            <a:r>
+              <a:rPr lang="en-US" sz="2600" dirty="0" smtClean="0"/>
+              <a:t> = MUX(c,min0,min1)</a:t>
+            </a:r>
+          </a:p>
+        </p:txBody>
+      </p:sp>
+      <p:sp>
+        <p:nvSpPr>
+          <p:cNvPr id="6" name="Right Arrow 5"/>
+          <p:cNvSpPr/>
+          <p:nvPr/>
+        </p:nvSpPr>
+        <p:spPr>
+          <a:xfrm>
+            <a:off x="3514975" y="2524009"/>
+            <a:ext cx="544424" cy="484632"/>
+          </a:xfrm>
+          <a:prstGeom prst="rightArrow">
+            <a:avLst/>
+          </a:prstGeom>
+        </p:spPr>
+        <p:style>
+          <a:lnRef idx="1">
+            <a:schemeClr val="accent1"/>
+          </a:lnRef>
+          <a:fillRef idx="3">
+            <a:schemeClr val="accent1"/>
+          </a:fillRef>
+          <a:effectRef idx="2">
+            <a:schemeClr val="accent1"/>
+          </a:effectRef>
+          <a:fontRef idx="minor">
+            <a:schemeClr val="lt1"/>
+          </a:fontRef>
+        </p:style>
+        <p:txBody>
+          <a:bodyPr rtlCol="0" anchor="ctr"/>
           <a:lstStyle/>
           <a:p>
+            <a:pPr algn="ctr"/>
+            <a:endParaRPr lang="en-US"/>
+          </a:p>
+        </p:txBody>
+      </p:sp>
+      <p:sp>
+        <p:nvSpPr>
+          <p:cNvPr id="7" name="Content Placeholder 2"/>
+          <p:cNvSpPr txBox="1">
+            <a:spLocks/>
+          </p:cNvSpPr>
+          <p:nvPr/>
+        </p:nvSpPr>
+        <p:spPr>
+          <a:xfrm>
+            <a:off x="1962150" y="3928264"/>
+            <a:ext cx="6102350" cy="2405062"/>
+          </a:xfrm>
+          <a:prstGeom prst="rect">
+            <a:avLst/>
+          </a:prstGeom>
+        </p:spPr>
+        <p:txBody>
+          <a:bodyPr vert="horz" lIns="91440" tIns="45720" rIns="91440" bIns="45720" rtlCol="0">
+            <a:normAutofit fontScale="85000" lnSpcReduction="20000"/>
+          </a:bodyPr>
+          <a:lstStyle>
+            <a:lvl1pPr marL="342900" indent="-342900" algn="l" defTabSz="457200" rtl="0" eaLnBrk="1" latinLnBrk="0" hangingPunct="1">
+              <a:spcBef>
+                <a:spcPct val="20000"/>
+              </a:spcBef>
+              <a:buFont typeface="Arial"/>
+              <a:buChar char="•"/>
+              <a:defRPr sz="3200" kern="1200">
+                <a:solidFill>
+                  <a:schemeClr val="tx1"/>
+                </a:solidFill>
+                <a:latin typeface="+mn-lt"/>
+                <a:ea typeface="+mn-ea"/>
+                <a:cs typeface="+mn-cs"/>
+              </a:defRPr>
+            </a:lvl1pPr>
+            <a:lvl2pPr marL="742950" indent="-285750" algn="l" defTabSz="457200" rtl="0" eaLnBrk="1" latinLnBrk="0" hangingPunct="1">
+              <a:spcBef>
+                <a:spcPct val="20000"/>
+              </a:spcBef>
+              <a:buFont typeface="Arial"/>
+              <a:buChar char="–"/>
+              <a:defRPr sz="2800" kern="1200">
+                <a:solidFill>
+                  <a:schemeClr val="tx1"/>
+                </a:solidFill>
+                <a:latin typeface="+mn-lt"/>
+                <a:ea typeface="+mn-ea"/>
+                <a:cs typeface="+mn-cs"/>
+              </a:defRPr>
+            </a:lvl2pPr>
+            <a:lvl3pPr marL="1143000" indent="-228600" algn="l" defTabSz="457200" rtl="0" eaLnBrk="1" latinLnBrk="0" hangingPunct="1">
+              <a:spcBef>
+                <a:spcPct val="20000"/>
+              </a:spcBef>
+              <a:buFont typeface="Arial"/>
+              <a:buChar char="•"/>
+              <a:defRPr sz="2400" kern="1200">
+                <a:solidFill>
+                  <a:schemeClr val="tx1"/>
+                </a:solidFill>
+                <a:latin typeface="+mn-lt"/>
+                <a:ea typeface="+mn-ea"/>
+                <a:cs typeface="+mn-cs"/>
+              </a:defRPr>
+            </a:lvl3pPr>
+            <a:lvl4pPr marL="1600200" indent="-228600" algn="l" defTabSz="457200" rtl="0" eaLnBrk="1" latinLnBrk="0" hangingPunct="1">
+              <a:spcBef>
+                <a:spcPct val="20000"/>
+              </a:spcBef>
+              <a:buFont typeface="Arial"/>
+              <a:buChar char="–"/>
+              <a:defRPr sz="2000" kern="1200">
+                <a:solidFill>
+                  <a:schemeClr val="tx1"/>
+                </a:solidFill>
+                <a:latin typeface="+mn-lt"/>
+                <a:ea typeface="+mn-ea"/>
+                <a:cs typeface="+mn-cs"/>
+              </a:defRPr>
+            </a:lvl4pPr>
+            <a:lvl5pPr marL="2057400" indent="-228600" algn="l" defTabSz="457200" rtl="0" eaLnBrk="1" latinLnBrk="0" hangingPunct="1">
+              <a:spcBef>
+                <a:spcPct val="20000"/>
+              </a:spcBef>
+              <a:buFont typeface="Arial"/>
+              <a:buChar char="»"/>
+              <a:defRPr sz="2000" kern="1200">
+                <a:solidFill>
+                  <a:schemeClr val="tx1"/>
+                </a:solidFill>
+                <a:latin typeface="+mn-lt"/>
+                <a:ea typeface="+mn-ea"/>
+                <a:cs typeface="+mn-cs"/>
+              </a:defRPr>
+            </a:lvl5pPr>
+            <a:lvl6pPr marL="2514600" indent="-228600" algn="l" defTabSz="457200" rtl="0" eaLnBrk="1" latinLnBrk="0" hangingPunct="1">
+              <a:spcBef>
+                <a:spcPct val="20000"/>
+              </a:spcBef>
+              <a:buFont typeface="Arial"/>
+              <a:buChar char="•"/>
+              <a:defRPr sz="2000" kern="1200">
+                <a:solidFill>
+                  <a:schemeClr val="tx1"/>
+                </a:solidFill>
+                <a:latin typeface="+mn-lt"/>
+                <a:ea typeface="+mn-ea"/>
+                <a:cs typeface="+mn-cs"/>
+              </a:defRPr>
+            </a:lvl6pPr>
+            <a:lvl7pPr marL="2971800" indent="-228600" algn="l" defTabSz="457200" rtl="0" eaLnBrk="1" latinLnBrk="0" hangingPunct="1">
+              <a:spcBef>
+                <a:spcPct val="20000"/>
+              </a:spcBef>
+              <a:buFont typeface="Arial"/>
+              <a:buChar char="•"/>
+              <a:defRPr sz="2000" kern="1200">
+                <a:solidFill>
+                  <a:schemeClr val="tx1"/>
+                </a:solidFill>
+                <a:latin typeface="+mn-lt"/>
+                <a:ea typeface="+mn-ea"/>
+                <a:cs typeface="+mn-cs"/>
+              </a:defRPr>
+            </a:lvl7pPr>
+            <a:lvl8pPr marL="3429000" indent="-228600" algn="l" defTabSz="457200" rtl="0" eaLnBrk="1" latinLnBrk="0" hangingPunct="1">
+              <a:spcBef>
+                <a:spcPct val="20000"/>
+              </a:spcBef>
+              <a:buFont typeface="Arial"/>
+              <a:buChar char="•"/>
+              <a:defRPr sz="2000" kern="1200">
+                <a:solidFill>
+                  <a:schemeClr val="tx1"/>
+                </a:solidFill>
+                <a:latin typeface="+mn-lt"/>
+                <a:ea typeface="+mn-ea"/>
+                <a:cs typeface="+mn-cs"/>
+              </a:defRPr>
+            </a:lvl8pPr>
+            <a:lvl9pPr marL="3886200" indent="-228600" algn="l" defTabSz="457200" rtl="0" eaLnBrk="1" latinLnBrk="0" hangingPunct="1">
+              <a:spcBef>
+                <a:spcPct val="20000"/>
+              </a:spcBef>
+              <a:buFont typeface="Arial"/>
+              <a:buChar char="•"/>
+              <a:defRPr sz="2000" kern="1200">
+                <a:solidFill>
+                  <a:schemeClr val="tx1"/>
+                </a:solidFill>
+                <a:latin typeface="+mn-lt"/>
+                <a:ea typeface="+mn-ea"/>
+                <a:cs typeface="+mn-cs"/>
+              </a:defRPr>
+            </a:lvl9pPr>
+          </a:lstStyle>
+          <a:p>
+            <a:pPr marL="0" indent="0">
+              <a:buNone/>
+            </a:pPr>
+            <a:r>
+              <a:rPr lang="en-US" sz="2600" dirty="0" err="1" smtClean="0"/>
+              <a:t>Vectorized</a:t>
+            </a:r>
+            <a:r>
+              <a:rPr lang="en-US" sz="2600" dirty="0" smtClean="0"/>
+              <a:t> MPC min:</a:t>
+            </a:r>
+            <a:endParaRPr lang="en-US" sz="2600" dirty="0" smtClean="0"/>
+          </a:p>
+          <a:p>
+            <a:pPr marL="0" indent="0">
+              <a:buNone/>
+            </a:pPr>
+            <a:r>
+              <a:rPr lang="en-US" sz="2600" b="1" dirty="0" smtClean="0"/>
+              <a:t>id = A[1]</a:t>
+            </a:r>
+            <a:endParaRPr lang="en-US" sz="2600" b="1" dirty="0" smtClean="0"/>
+          </a:p>
+          <a:p>
+            <a:pPr marL="0" indent="0">
+              <a:buNone/>
+            </a:pPr>
+            <a:r>
+              <a:rPr lang="en-US" sz="2600" b="1" dirty="0" smtClean="0"/>
+              <a:t>min = DIV(</a:t>
+            </a:r>
+            <a:r>
+              <a:rPr lang="en-US" sz="2600" b="1" dirty="0" err="1" smtClean="0"/>
+              <a:t>A,bin_op,id</a:t>
+            </a:r>
+            <a:r>
+              <a:rPr lang="en-US" sz="2600" b="1" dirty="0" smtClean="0"/>
+              <a:t>)</a:t>
+            </a:r>
+            <a:r>
+              <a:rPr lang="en-US" sz="2600" dirty="0" smtClean="0"/>
+              <a:t> </a:t>
+            </a:r>
+          </a:p>
+          <a:p>
+            <a:pPr marL="0" indent="0">
+              <a:buNone/>
+            </a:pPr>
+            <a:r>
+              <a:rPr lang="en-US" sz="2600" dirty="0" smtClean="0"/>
+              <a:t>where </a:t>
+            </a:r>
+          </a:p>
+          <a:p>
+            <a:pPr marL="0" indent="0">
+              <a:buNone/>
+            </a:pPr>
+            <a:r>
+              <a:rPr lang="en-US" sz="2600" dirty="0" smtClean="0"/>
+              <a:t>   </a:t>
+            </a:r>
+            <a:r>
+              <a:rPr lang="en-US" sz="2600" dirty="0" err="1" smtClean="0"/>
+              <a:t>bin_op</a:t>
+            </a:r>
+            <a:r>
+              <a:rPr lang="en-US" sz="2600" dirty="0" smtClean="0"/>
+              <a:t>(</a:t>
+            </a:r>
+            <a:r>
+              <a:rPr lang="en-US" sz="2600" dirty="0" err="1" smtClean="0"/>
+              <a:t>a,b</a:t>
+            </a:r>
+            <a:r>
+              <a:rPr lang="en-US" sz="2600" dirty="0" smtClean="0"/>
+              <a:t>): # </a:t>
+            </a:r>
+            <a:r>
+              <a:rPr lang="en-US" sz="2600" dirty="0" err="1" smtClean="0"/>
+              <a:t>simdified</a:t>
+            </a:r>
+            <a:r>
+              <a:rPr lang="en-US" sz="2600" dirty="0" smtClean="0"/>
+              <a:t> in obvious way</a:t>
+            </a:r>
+          </a:p>
+          <a:p>
+            <a:pPr marL="0" indent="0">
+              <a:buNone/>
+            </a:pPr>
+            <a:r>
+              <a:rPr lang="en-US" sz="2600" dirty="0"/>
+              <a:t> </a:t>
+            </a:r>
+            <a:r>
+              <a:rPr lang="en-US" sz="2600" dirty="0" smtClean="0"/>
+              <a:t>    c = CMP(</a:t>
+            </a:r>
+            <a:r>
+              <a:rPr lang="en-US" sz="2600" dirty="0" err="1" smtClean="0"/>
+              <a:t>a,b</a:t>
+            </a:r>
+            <a:r>
+              <a:rPr lang="en-US" sz="2600" dirty="0" smtClean="0"/>
+              <a:t>)</a:t>
+            </a:r>
+          </a:p>
+          <a:p>
+            <a:pPr marL="0" indent="0">
+              <a:buNone/>
+            </a:pPr>
+            <a:r>
+              <a:rPr lang="en-US" sz="2600" dirty="0"/>
+              <a:t> </a:t>
+            </a:r>
+            <a:r>
+              <a:rPr lang="en-US" sz="2600" dirty="0" smtClean="0"/>
+              <a:t>    min = MUX(</a:t>
+            </a:r>
+            <a:r>
+              <a:rPr lang="en-US" sz="2600" dirty="0" err="1" smtClean="0"/>
+              <a:t>c,a,b</a:t>
+            </a:r>
+            <a:r>
+              <a:rPr lang="en-US" sz="2600" dirty="0" smtClean="0"/>
+              <a:t>)</a:t>
+            </a:r>
+            <a:endParaRPr lang="en-US" sz="2600" dirty="0" smtClean="0"/>
+          </a:p>
+          <a:p>
+            <a:pPr marL="0" indent="0">
+              <a:buNone/>
+            </a:pPr>
+            <a:endParaRPr lang="en-US" sz="2600" dirty="0" smtClean="0"/>
+          </a:p>
+        </p:txBody>
+      </p:sp>
+      <p:sp>
+        <p:nvSpPr>
+          <p:cNvPr id="8" name="Right Arrow 7"/>
+          <p:cNvSpPr/>
+          <p:nvPr/>
+        </p:nvSpPr>
+        <p:spPr>
+          <a:xfrm>
+            <a:off x="1108325" y="4978395"/>
+            <a:ext cx="544424" cy="430546"/>
+          </a:xfrm>
+          <a:prstGeom prst="rightArrow">
+            <a:avLst/>
+          </a:prstGeom>
+        </p:spPr>
+        <p:style>
+          <a:lnRef idx="1">
+            <a:schemeClr val="accent1"/>
+          </a:lnRef>
+          <a:fillRef idx="3">
+            <a:schemeClr val="accent1"/>
+          </a:fillRef>
+          <a:effectRef idx="2">
+            <a:schemeClr val="accent1"/>
+          </a:effectRef>
+          <a:fontRef idx="minor">
+            <a:schemeClr val="lt1"/>
+          </a:fontRef>
+        </p:style>
+        <p:txBody>
+          <a:bodyPr rtlCol="0" anchor="ctr"/>
+          <a:lstStyle/>
+          <a:p>
+            <a:pPr algn="ctr"/>
             <a:endParaRPr lang="en-US"/>
           </a:p>
         </p:txBody>
@@ -5232,22 +6100,14 @@
             <a:pPr lvl="1"/>
             <a:r>
               <a:rPr lang="is-IS" dirty="0" smtClean="0"/>
-              <a:t>ast.List: [</a:t>
-            </a:r>
-            <a:r>
-              <a:rPr lang="is-IS" smtClean="0"/>
-              <a:t>elts] </a:t>
+              <a:t>ast.List: [elts] </a:t>
             </a:r>
           </a:p>
           <a:p>
             <a:pPr lvl="2"/>
             <a:r>
-              <a:rPr lang="is-IS" smtClean="0"/>
-              <a:t>0 </a:t>
-            </a:r>
-            <a:r>
               <a:rPr lang="is-IS" dirty="0" smtClean="0"/>
-              <a:t>or more elts. </a:t>
+              <a:t>0 or more elts. </a:t>
             </a:r>
             <a:r>
               <a:rPr lang="en-US" dirty="0" smtClean="0"/>

</xml_diff>